<commit_message>
for demonstration purposes only lol
</commit_message>
<xml_diff>
--- a/poster/Presentation1.pptx
+++ b/poster/Presentation1.pptx
@@ -3981,18 +3981,25 @@
                     <a:t>，並依序利用</a:t>
                   </a:r>
                   <a:r>
-                    <a:rPr lang="en-US" altLang="zh-TW" sz="2800" dirty="0">
+                    <a:rPr lang="en-US" altLang="zh-TW" sz="2800" smtClean="0">
                       <a:latin typeface="微軟正黑體" panose="020B0604030504040204" pitchFamily="34" charset="-120"/>
                       <a:ea typeface="微軟正黑體" panose="020B0604030504040204" pitchFamily="34" charset="-120"/>
                     </a:rPr>
-                    <a:t>DP</a:t>
+                    <a:t>DFS</a:t>
+                  </a:r>
+                  <a:r>
+                    <a:rPr lang="zh-TW" altLang="en-US" sz="2800" smtClean="0">
+                      <a:latin typeface="微軟正黑體" panose="020B0604030504040204" pitchFamily="34" charset="-120"/>
+                      <a:ea typeface="微軟正黑體" panose="020B0604030504040204" pitchFamily="34" charset="-120"/>
+                    </a:rPr>
+                    <a:t>找出</a:t>
                   </a:r>
                   <a:r>
                     <a:rPr lang="zh-TW" altLang="en-US" sz="2800" dirty="0">
                       <a:latin typeface="微軟正黑體" panose="020B0604030504040204" pitchFamily="34" charset="-120"/>
                       <a:ea typeface="微軟正黑體" panose="020B0604030504040204" pitchFamily="34" charset="-120"/>
                     </a:rPr>
-                    <a:t>找出能轉至基底的路徑</a:t>
+                    <a:t>能轉至基底的路徑</a:t>
                   </a:r>
                   <a:endParaRPr lang="en-US" altLang="zh-TW" sz="2800" dirty="0">
                     <a:latin typeface="微軟正黑體" panose="020B0604030504040204" pitchFamily="34" charset="-120"/>
@@ -4470,21 +4477,35 @@
                     <a:latin typeface="微軟正黑體" panose="020B0604030504040204" pitchFamily="34" charset="-120"/>
                     <a:ea typeface="微軟正黑體" panose="020B0604030504040204" pitchFamily="34" charset="-120"/>
                   </a:rPr>
-                  <a:t>計算縫線路徑累積的影像差值後除以縫線長度，當作決定縫線好壞的標準，存入一二維陣列，最後根據此陣列利用</a:t>
+                  <a:t>計算縫線路徑累積的影像差值後除以縫線長度，當作決定縫線好壞的標準，存入一二維陣列，最後根據此陣列</a:t>
+                </a:r>
+                <a:r>
+                  <a:rPr lang="zh-TW" altLang="en-US" sz="2800" dirty="0" smtClean="0">
+                    <a:latin typeface="微軟正黑體" panose="020B0604030504040204" pitchFamily="34" charset="-120"/>
+                    <a:ea typeface="微軟正黑體" panose="020B0604030504040204" pitchFamily="34" charset="-120"/>
+                  </a:rPr>
+                  <a:t>利用</a:t>
                 </a:r>
                 <a:r>
                   <a:rPr lang="en-US" altLang="zh-TW" sz="2800" dirty="0" smtClean="0">
                     <a:latin typeface="微軟正黑體" panose="020B0604030504040204" pitchFamily="34" charset="-120"/>
                     <a:ea typeface="微軟正黑體" panose="020B0604030504040204" pitchFamily="34" charset="-120"/>
                   </a:rPr>
-                  <a:t>DP</a:t>
+                  <a:t>DFS</a:t>
                 </a:r>
                 <a:r>
                   <a:rPr lang="zh-TW" altLang="en-US" sz="2800" dirty="0" smtClean="0">
                     <a:latin typeface="微軟正黑體" panose="020B0604030504040204" pitchFamily="34" charset="-120"/>
                     <a:ea typeface="微軟正黑體" panose="020B0604030504040204" pitchFamily="34" charset="-120"/>
                   </a:rPr>
-                  <a:t>找出最佳縫合影像的順序</a:t>
+                  <a:t>找出</a:t>
+                </a:r>
+                <a:r>
+                  <a:rPr lang="zh-TW" altLang="en-US" sz="2800" dirty="0" smtClean="0">
+                    <a:latin typeface="微軟正黑體" panose="020B0604030504040204" pitchFamily="34" charset="-120"/>
+                    <a:ea typeface="微軟正黑體" panose="020B0604030504040204" pitchFamily="34" charset="-120"/>
+                  </a:rPr>
+                  <a:t>最佳縫合影像的順序</a:t>
                 </a:r>
                 <a:endParaRPr lang="en-US" altLang="zh-TW" sz="2800" dirty="0" smtClean="0">
                   <a:latin typeface="微軟正黑體" panose="020B0604030504040204" pitchFamily="34" charset="-120"/>
@@ -4571,14 +4592,7 @@
                     <a:latin typeface="微軟正黑體" panose="020B0604030504040204" pitchFamily="34" charset="-120"/>
                     <a:ea typeface="微軟正黑體" panose="020B0604030504040204" pitchFamily="34" charset="-120"/>
                   </a:rPr>
-                  <a:t>根據縫合順序縫合</a:t>
-                </a:r>
-                <a:r>
-                  <a:rPr lang="zh-TW" altLang="en-US" sz="2800" dirty="0" smtClean="0">
-                    <a:latin typeface="微軟正黑體" panose="020B0604030504040204" pitchFamily="34" charset="-120"/>
-                    <a:ea typeface="微軟正黑體" panose="020B0604030504040204" pitchFamily="34" charset="-120"/>
-                  </a:rPr>
-                  <a:t>影像</a:t>
+                  <a:t>根據縫合順序縫合影像</a:t>
                 </a:r>
                 <a:endParaRPr lang="en-US" altLang="zh-TW" sz="2800" dirty="0" smtClean="0">
                   <a:latin typeface="微軟正黑體" panose="020B0604030504040204" pitchFamily="34" charset="-120"/>

</xml_diff>